<commit_message>
more Micro work and the end of DLD lab:)
</commit_message>
<xml_diff>
--- a/Microprocessor /class work/16-2(questions - CW11).pptx
+++ b/Microprocessor /class work/16-2(questions - CW11).pptx
@@ -3614,11 +3614,7 @@
           <a:p>
             <a:r>
               <a:rPr lang="en-US" altLang="en-US" dirty="0" smtClean="0"/>
-              <a:t>Class Work #</a:t>
-            </a:r>
-            <a:r>
-              <a:rPr lang="en-US" altLang="en-US" dirty="0" smtClean="0"/>
-              <a:t>1</a:t>
+              <a:t>Class Work #1</a:t>
             </a:r>
             <a:r>
               <a:rPr lang="fa-IR" altLang="en-US" dirty="0"/>
@@ -3671,7 +3667,7 @@
 </file>
 
 <file path=ppt/slides/slide3.xml><?xml version="1.0" encoding="utf-8"?>
-<p:sld xmlns:a="http://schemas.openxmlformats.org/drawingml/2006/main" xmlns:r="http://schemas.openxmlformats.org/officeDocument/2006/relationships" xmlns:p="http://schemas.openxmlformats.org/presentationml/2006/main" show="0">
+<p:sld xmlns:a="http://schemas.openxmlformats.org/drawingml/2006/main" xmlns:r="http://schemas.openxmlformats.org/officeDocument/2006/relationships" xmlns:p="http://schemas.openxmlformats.org/presentationml/2006/main">
   <p:cSld>
     <p:spTree>
       <p:nvGrpSpPr>
@@ -3733,11 +3729,11 @@
   <p:clrMapOvr>
     <a:masterClrMapping/>
   </p:clrMapOvr>
-  <mc:AlternateContent xmlns:mc="http://schemas.openxmlformats.org/markup-compatibility/2006" xmlns:p14="http://schemas.microsoft.com/office/powerpoint/2010/main">
-    <mc:Choice Requires="p14">
+  <mc:AlternateContent xmlns:mc="http://schemas.openxmlformats.org/markup-compatibility/2006">
+    <mc:Choice xmlns:p14="http://schemas.microsoft.com/office/powerpoint/2010/main" Requires="p14">
       <p:transition spd="slow" p14:dur="2000"/>
     </mc:Choice>
-    <mc:Fallback xmlns="">
+    <mc:Fallback>
       <p:transition spd="slow"/>
     </mc:Fallback>
   </mc:AlternateContent>
@@ -3752,7 +3748,7 @@
 </file>
 
 <file path=ppt/slides/slide4.xml><?xml version="1.0" encoding="utf-8"?>
-<p:sld xmlns:a="http://schemas.openxmlformats.org/drawingml/2006/main" xmlns:r="http://schemas.openxmlformats.org/officeDocument/2006/relationships" xmlns:p="http://schemas.openxmlformats.org/presentationml/2006/main" show="0">
+<p:sld xmlns:a="http://schemas.openxmlformats.org/drawingml/2006/main" xmlns:r="http://schemas.openxmlformats.org/officeDocument/2006/relationships" xmlns:p="http://schemas.openxmlformats.org/presentationml/2006/main">
   <p:cSld>
     <p:spTree>
       <p:nvGrpSpPr>
@@ -3905,11 +3901,11 @@
   <p:clrMapOvr>
     <a:masterClrMapping/>
   </p:clrMapOvr>
-  <mc:AlternateContent xmlns:mc="http://schemas.openxmlformats.org/markup-compatibility/2006" xmlns:p14="http://schemas.microsoft.com/office/powerpoint/2010/main">
-    <mc:Choice Requires="p14">
+  <mc:AlternateContent xmlns:mc="http://schemas.openxmlformats.org/markup-compatibility/2006">
+    <mc:Choice xmlns:p14="http://schemas.microsoft.com/office/powerpoint/2010/main" Requires="p14">
       <p:transition spd="slow" p14:dur="2000"/>
     </mc:Choice>
-    <mc:Fallback xmlns="">
+    <mc:Fallback>
       <p:transition spd="slow"/>
     </mc:Fallback>
   </mc:AlternateContent>

</xml_diff>